<commit_message>
Made some changes on HW5
</commit_message>
<xml_diff>
--- a/HW5_Design_Diagrams/T05 _ CUBESAT HW05.pptx
+++ b/HW5_Design_Diagrams/T05 _ CUBESAT HW05.pptx
@@ -310,7 +310,7 @@
           <a:p>
             <a:fld id="{465FB7FF-4A76-43F4-B3E9-8144B6754821}" type="datetimeFigureOut">
               <a:rPr lang="en-US" smtClean="0"/>
-              <a:t>12/9/2015</a:t>
+              <a:t>12/10/2015</a:t>
             </a:fld>
             <a:endParaRPr lang="en-US"/>
           </a:p>
@@ -480,7 +480,7 @@
           <a:p>
             <a:fld id="{465FB7FF-4A76-43F4-B3E9-8144B6754821}" type="datetimeFigureOut">
               <a:rPr lang="en-US" smtClean="0"/>
-              <a:t>12/9/2015</a:t>
+              <a:t>12/10/2015</a:t>
             </a:fld>
             <a:endParaRPr lang="en-US"/>
           </a:p>
@@ -660,7 +660,7 @@
           <a:p>
             <a:fld id="{465FB7FF-4A76-43F4-B3E9-8144B6754821}" type="datetimeFigureOut">
               <a:rPr lang="en-US" smtClean="0"/>
-              <a:t>12/9/2015</a:t>
+              <a:t>12/10/2015</a:t>
             </a:fld>
             <a:endParaRPr lang="en-US"/>
           </a:p>
@@ -830,7 +830,7 @@
           <a:p>
             <a:fld id="{465FB7FF-4A76-43F4-B3E9-8144B6754821}" type="datetimeFigureOut">
               <a:rPr lang="en-US" smtClean="0"/>
-              <a:t>12/9/2015</a:t>
+              <a:t>12/10/2015</a:t>
             </a:fld>
             <a:endParaRPr lang="en-US"/>
           </a:p>
@@ -1076,7 +1076,7 @@
           <a:p>
             <a:fld id="{465FB7FF-4A76-43F4-B3E9-8144B6754821}" type="datetimeFigureOut">
               <a:rPr lang="en-US" smtClean="0"/>
-              <a:t>12/9/2015</a:t>
+              <a:t>12/10/2015</a:t>
             </a:fld>
             <a:endParaRPr lang="en-US"/>
           </a:p>
@@ -1364,7 +1364,7 @@
           <a:p>
             <a:fld id="{465FB7FF-4A76-43F4-B3E9-8144B6754821}" type="datetimeFigureOut">
               <a:rPr lang="en-US" smtClean="0"/>
-              <a:t>12/9/2015</a:t>
+              <a:t>12/10/2015</a:t>
             </a:fld>
             <a:endParaRPr lang="en-US"/>
           </a:p>
@@ -1786,7 +1786,7 @@
           <a:p>
             <a:fld id="{465FB7FF-4A76-43F4-B3E9-8144B6754821}" type="datetimeFigureOut">
               <a:rPr lang="en-US" smtClean="0"/>
-              <a:t>12/9/2015</a:t>
+              <a:t>12/10/2015</a:t>
             </a:fld>
             <a:endParaRPr lang="en-US"/>
           </a:p>
@@ -1904,7 +1904,7 @@
           <a:p>
             <a:fld id="{465FB7FF-4A76-43F4-B3E9-8144B6754821}" type="datetimeFigureOut">
               <a:rPr lang="en-US" smtClean="0"/>
-              <a:t>12/9/2015</a:t>
+              <a:t>12/10/2015</a:t>
             </a:fld>
             <a:endParaRPr lang="en-US"/>
           </a:p>
@@ -1999,7 +1999,7 @@
           <a:p>
             <a:fld id="{465FB7FF-4A76-43F4-B3E9-8144B6754821}" type="datetimeFigureOut">
               <a:rPr lang="en-US" smtClean="0"/>
-              <a:t>12/9/2015</a:t>
+              <a:t>12/10/2015</a:t>
             </a:fld>
             <a:endParaRPr lang="en-US"/>
           </a:p>
@@ -2276,7 +2276,7 @@
           <a:p>
             <a:fld id="{465FB7FF-4A76-43F4-B3E9-8144B6754821}" type="datetimeFigureOut">
               <a:rPr lang="en-US" smtClean="0"/>
-              <a:t>12/9/2015</a:t>
+              <a:t>12/10/2015</a:t>
             </a:fld>
             <a:endParaRPr lang="en-US"/>
           </a:p>
@@ -2529,7 +2529,7 @@
           <a:p>
             <a:fld id="{465FB7FF-4A76-43F4-B3E9-8144B6754821}" type="datetimeFigureOut">
               <a:rPr lang="en-US" smtClean="0"/>
-              <a:t>12/9/2015</a:t>
+              <a:t>12/10/2015</a:t>
             </a:fld>
             <a:endParaRPr lang="en-US"/>
           </a:p>
@@ -2742,7 +2742,7 @@
           <a:p>
             <a:fld id="{465FB7FF-4A76-43F4-B3E9-8144B6754821}" type="datetimeFigureOut">
               <a:rPr lang="en-US" smtClean="0"/>
-              <a:t>12/9/2015</a:t>
+              <a:t>12/10/2015</a:t>
             </a:fld>
             <a:endParaRPr lang="en-US"/>
           </a:p>
@@ -3401,7 +3401,7 @@
                     <a:ea typeface="Calibri" pitchFamily="34" charset="0"/>
                     <a:cs typeface="Times New Roman" pitchFamily="18" charset="0"/>
                   </a:rPr>
-                  <a:t>USB Power</a:t>
+                  <a:t>Power</a:t>
                 </a:r>
                 <a:endParaRPr kumimoji="0" lang="en-US" altLang="en-US" sz="3200" b="0" i="0" u="none" strike="noStrike" cap="none" normalizeH="0" baseline="0" dirty="0" smtClean="0">
                   <a:ln>
@@ -3491,18 +3491,6 @@
                   </a:rPr>
                   <a:t>On/Off</a:t>
                 </a:r>
-                <a:endParaRPr kumimoji="0" lang="en-US" altLang="en-US" b="0" i="0" u="none" strike="noStrike" cap="none" normalizeH="0" baseline="0" dirty="0" smtClean="0">
-                  <a:ln>
-                    <a:noFill/>
-                  </a:ln>
-                  <a:solidFill>
-                    <a:schemeClr val="tx1"/>
-                  </a:solidFill>
-                  <a:effectLst/>
-                  <a:latin typeface="Calibri" pitchFamily="34" charset="0"/>
-                  <a:ea typeface="Calibri" pitchFamily="34" charset="0"/>
-                  <a:cs typeface="Times New Roman" pitchFamily="18" charset="0"/>
-                </a:endParaRPr>
               </a:p>
               <a:p>
                 <a:pPr marL="0" marR="0" lvl="0" indent="0" algn="r" defTabSz="914400" rtl="0" eaLnBrk="1" fontAlgn="base" latinLnBrk="0" hangingPunct="1">
@@ -4060,42 +4048,6 @@
       </p:cxnSp>
       <p:cxnSp>
         <p:nvCxnSpPr>
-          <p:cNvPr id="37" name="Straight Arrow Connector 36"/>
-          <p:cNvCxnSpPr/>
-          <p:nvPr/>
-        </p:nvCxnSpPr>
-        <p:spPr>
-          <a:xfrm>
-            <a:off x="2889672" y="1912921"/>
-            <a:ext cx="696279" cy="1"/>
-          </a:xfrm>
-          <a:prstGeom prst="straightConnector1">
-            <a:avLst/>
-          </a:prstGeom>
-          <a:ln>
-            <a:solidFill>
-              <a:schemeClr val="tx1"/>
-            </a:solidFill>
-            <a:tailEnd type="arrow"/>
-          </a:ln>
-        </p:spPr>
-        <p:style>
-          <a:lnRef idx="1">
-            <a:schemeClr val="accent1"/>
-          </a:lnRef>
-          <a:fillRef idx="0">
-            <a:schemeClr val="accent1"/>
-          </a:fillRef>
-          <a:effectRef idx="0">
-            <a:schemeClr val="accent1"/>
-          </a:effectRef>
-          <a:fontRef idx="minor">
-            <a:schemeClr val="tx1"/>
-          </a:fontRef>
-        </p:style>
-      </p:cxnSp>
-      <p:cxnSp>
-        <p:nvCxnSpPr>
           <p:cNvPr id="40" name="Straight Arrow Connector 39"/>
           <p:cNvCxnSpPr/>
           <p:nvPr/>
@@ -4175,14 +4127,14 @@
           <p:nvPr>
             <p:extLst>
               <p:ext uri="{D42A27DB-BD31-4B8C-83A1-F6EECF244321}">
-                <p14:modId xmlns:p14="http://schemas.microsoft.com/office/powerpoint/2010/main" val="4159418594"/>
+                <p14:modId xmlns:p14="http://schemas.microsoft.com/office/powerpoint/2010/main" val="3010978254"/>
               </p:ext>
             </p:extLst>
           </p:nvPr>
         </p:nvGraphicFramePr>
         <p:xfrm>
           <a:off x="461604" y="2787389"/>
-          <a:ext cx="8412480" cy="3779520"/>
+          <a:ext cx="8412480" cy="3535680"/>
         </p:xfrm>
         <a:graphic>
           <a:graphicData uri="http://schemas.openxmlformats.org/drawingml/2006/table">
@@ -4294,26 +4246,16 @@
                           <a:latin typeface="Times New Roman" panose="02020603050405020304" pitchFamily="18" charset="0"/>
                           <a:cs typeface="Times New Roman" panose="02020603050405020304" pitchFamily="18" charset="0"/>
                         </a:rPr>
-                        <a:t>!Reset: Reset Button</a:t>
+                        <a:t>!Reset: Reset </a:t>
                       </a:r>
-                    </a:p>
-                    <a:p>
-                      <a:pPr marL="342900" indent="-342900">
-                        <a:buAutoNum type="arabicParenR"/>
-                      </a:pPr>
                       <a:r>
                         <a:rPr lang="en-US" sz="1600" baseline="0" dirty="0" smtClean="0">
                           <a:latin typeface="Times New Roman" panose="02020603050405020304" pitchFamily="18" charset="0"/>
                           <a:cs typeface="Times New Roman" panose="02020603050405020304" pitchFamily="18" charset="0"/>
                         </a:rPr>
-                        <a:t>Debug: Debug with JTAG</a:t>
+                        <a:t>Button</a:t>
                       </a:r>
-                    </a:p>
-                    <a:p>
-                      <a:pPr marL="0" indent="0">
-                        <a:buNone/>
-                      </a:pPr>
-                      <a:endParaRPr lang="en-US" sz="1600" dirty="0">
+                      <a:endParaRPr lang="en-US" sz="1600" baseline="0" dirty="0" smtClean="0">
                         <a:latin typeface="Times New Roman" panose="02020603050405020304" pitchFamily="18" charset="0"/>
                         <a:cs typeface="Times New Roman" panose="02020603050405020304" pitchFamily="18" charset="0"/>
                       </a:endParaRPr>
@@ -4389,12 +4331,41 @@
                           <a:latin typeface="Times New Roman" panose="02020603050405020304" pitchFamily="18" charset="0"/>
                           <a:cs typeface="Times New Roman" panose="02020603050405020304" pitchFamily="18" charset="0"/>
                         </a:rPr>
-                        <a:t> breakout pins</a:t>
+                        <a:t> breakout </a:t>
                       </a:r>
-                      <a:endParaRPr lang="en-US" sz="1600" dirty="0">
-                        <a:latin typeface="Times New Roman" panose="02020603050405020304" pitchFamily="18" charset="0"/>
-                        <a:cs typeface="Times New Roman" panose="02020603050405020304" pitchFamily="18" charset="0"/>
-                      </a:endParaRPr>
+                      <a:r>
+                        <a:rPr lang="en-US" sz="1600" baseline="0" dirty="0" smtClean="0">
+                          <a:latin typeface="Times New Roman" panose="02020603050405020304" pitchFamily="18" charset="0"/>
+                          <a:cs typeface="Times New Roman" panose="02020603050405020304" pitchFamily="18" charset="0"/>
+                        </a:rPr>
+                        <a:t>pins</a:t>
+                      </a:r>
+                    </a:p>
+                    <a:p>
+                      <a:pPr marL="342900" marR="0" indent="-342900" algn="l" defTabSz="914400" rtl="0" eaLnBrk="1" fontAlgn="auto" latinLnBrk="0" hangingPunct="1">
+                        <a:lnSpc>
+                          <a:spcPct val="100000"/>
+                        </a:lnSpc>
+                        <a:spcBef>
+                          <a:spcPts val="0"/>
+                        </a:spcBef>
+                        <a:spcAft>
+                          <a:spcPts val="0"/>
+                        </a:spcAft>
+                        <a:buClrTx/>
+                        <a:buSzTx/>
+                        <a:buFontTx/>
+                        <a:buAutoNum type="arabicParenR"/>
+                        <a:tabLst/>
+                        <a:defRPr/>
+                      </a:pPr>
+                      <a:r>
+                        <a:rPr lang="en-US" sz="1600" baseline="0" dirty="0" smtClean="0">
+                          <a:latin typeface="Times New Roman" panose="02020603050405020304" pitchFamily="18" charset="0"/>
+                          <a:cs typeface="Times New Roman" panose="02020603050405020304" pitchFamily="18" charset="0"/>
+                        </a:rPr>
+                        <a:t>Debug: Debug with JTAG</a:t>
+                      </a:r>
                     </a:p>
                   </a:txBody>
                   <a:tcPr/>
@@ -4453,6 +4424,43 @@
           </a:graphicData>
         </a:graphic>
       </p:graphicFrame>
+      <p:cxnSp>
+        <p:nvCxnSpPr>
+          <p:cNvPr id="24" name="Straight Arrow Connector 23"/>
+          <p:cNvCxnSpPr/>
+          <p:nvPr/>
+        </p:nvCxnSpPr>
+        <p:spPr>
+          <a:xfrm>
+            <a:off x="2879345" y="1916832"/>
+            <a:ext cx="706140" cy="0"/>
+          </a:xfrm>
+          <a:prstGeom prst="straightConnector1">
+            <a:avLst/>
+          </a:prstGeom>
+          <a:ln>
+            <a:solidFill>
+              <a:schemeClr val="tx1"/>
+            </a:solidFill>
+            <a:headEnd type="arrow"/>
+            <a:tailEnd type="arrow"/>
+          </a:ln>
+        </p:spPr>
+        <p:style>
+          <a:lnRef idx="1">
+            <a:schemeClr val="accent1"/>
+          </a:lnRef>
+          <a:fillRef idx="0">
+            <a:schemeClr val="accent1"/>
+          </a:fillRef>
+          <a:effectRef idx="0">
+            <a:schemeClr val="accent1"/>
+          </a:effectRef>
+          <a:fontRef idx="minor">
+            <a:schemeClr val="tx1"/>
+          </a:fontRef>
+        </p:style>
+      </p:cxnSp>
     </p:spTree>
     <p:extLst>
       <p:ext uri="{BB962C8B-B14F-4D97-AF65-F5344CB8AC3E}">
@@ -4729,7 +4737,7 @@
           </p:nvSpPr>
           <p:spPr bwMode="auto">
             <a:xfrm rot="10800000" flipV="1">
-              <a:off x="286302" y="2155221"/>
+              <a:off x="286302" y="2253354"/>
               <a:ext cx="1313421" cy="238916"/>
             </a:xfrm>
             <a:prstGeom prst="rect">
@@ -4782,7 +4790,7 @@
                   <a:ea typeface="Calibri" pitchFamily="34" charset="0"/>
                   <a:cs typeface="Times New Roman" pitchFamily="18" charset="0"/>
                 </a:rPr>
-                <a:t>USB/UART Power</a:t>
+                <a:t>USB</a:t>
               </a:r>
               <a:endParaRPr kumimoji="0" lang="en-US" altLang="en-US" sz="3200" b="0" i="0" u="none" strike="noStrike" cap="none" normalizeH="0" baseline="0" dirty="0" smtClean="0">
                 <a:ln>
@@ -4970,27 +4978,12 @@
                 <a:tabLst/>
               </a:pPr>
               <a:r>
-                <a:rPr lang="en-US" altLang="en-US" sz="1400" dirty="0" err="1">
+                <a:rPr lang="en-US" altLang="en-US" sz="1400" dirty="0">
                   <a:latin typeface="Calibri" pitchFamily="34" charset="0"/>
                   <a:ea typeface="Calibri" pitchFamily="34" charset="0"/>
                   <a:cs typeface="Times New Roman" pitchFamily="18" charset="0"/>
                 </a:rPr>
                 <a:t>m</a:t>
-              </a:r>
-              <a:r>
-                <a:rPr kumimoji="0" lang="en-US" altLang="en-US" sz="1400" b="0" i="0" u="none" strike="noStrike" cap="none" normalizeH="0" dirty="0" err="1" smtClean="0">
-                  <a:ln>
-                    <a:noFill/>
-                  </a:ln>
-                  <a:solidFill>
-                    <a:schemeClr val="tx1"/>
-                  </a:solidFill>
-                  <a:effectLst/>
-                  <a:latin typeface="Calibri" pitchFamily="34" charset="0"/>
-                  <a:ea typeface="Calibri" pitchFamily="34" charset="0"/>
-                  <a:cs typeface="Times New Roman" pitchFamily="18" charset="0"/>
-                </a:rPr>
-                <a:t>ent</a:t>
               </a:r>
               <a:r>
                 <a:rPr kumimoji="0" lang="en-US" altLang="en-US" sz="1400" b="0" i="0" u="none" strike="noStrike" cap="none" normalizeH="0" dirty="0" smtClean="0">
@@ -5005,7 +4998,7 @@
                   <a:ea typeface="Calibri" pitchFamily="34" charset="0"/>
                   <a:cs typeface="Times New Roman" pitchFamily="18" charset="0"/>
                 </a:rPr>
-                <a:t> System</a:t>
+                <a:t>ent System</a:t>
               </a:r>
               <a:endParaRPr kumimoji="0" lang="en-US" altLang="en-US" sz="1400" b="0" i="0" u="none" strike="noStrike" cap="none" normalizeH="0" baseline="0" dirty="0" smtClean="0">
                 <a:ln>
@@ -5284,14 +5277,7 @@
                   <a:latin typeface="Calibri" pitchFamily="34" charset="0"/>
                   <a:cs typeface="Times New Roman" pitchFamily="18" charset="0"/>
                 </a:rPr>
-                <a:t>RF </a:t>
-              </a:r>
-              <a:r>
-                <a:rPr lang="en-US" altLang="en-US" sz="1600" dirty="0" smtClean="0">
-                  <a:latin typeface="Calibri" pitchFamily="34" charset="0"/>
-                  <a:cs typeface="Times New Roman" pitchFamily="18" charset="0"/>
-                </a:rPr>
-                <a:t>Filter</a:t>
+                <a:t>RF Filter</a:t>
               </a:r>
               <a:endParaRPr kumimoji="0" lang="en-US" altLang="en-US" sz="2800" b="0" i="0" u="none" strike="noStrike" cap="none" normalizeH="0" baseline="0" dirty="0" smtClean="0">
                 <a:ln>
@@ -5963,7 +5949,7 @@
         </p:nvSpPr>
         <p:spPr bwMode="auto">
           <a:xfrm rot="10800000" flipV="1">
-            <a:off x="321934" y="1275447"/>
+            <a:off x="321934" y="1300560"/>
             <a:ext cx="1313421" cy="238916"/>
           </a:xfrm>
           <a:prstGeom prst="rect">
@@ -6032,39 +6018,6 @@
           </a:p>
         </p:txBody>
       </p:sp>
-      <p:cxnSp>
-        <p:nvCxnSpPr>
-          <p:cNvPr id="5" name="Straight Arrow Connector 4"/>
-          <p:cNvCxnSpPr/>
-          <p:nvPr/>
-        </p:nvCxnSpPr>
-        <p:spPr>
-          <a:xfrm>
-            <a:off x="1596603" y="1430910"/>
-            <a:ext cx="1130140" cy="0"/>
-          </a:xfrm>
-          <a:prstGeom prst="straightConnector1">
-            <a:avLst/>
-          </a:prstGeom>
-          <a:ln>
-            <a:tailEnd type="triangle"/>
-          </a:ln>
-        </p:spPr>
-        <p:style>
-          <a:lnRef idx="2">
-            <a:schemeClr val="dk1"/>
-          </a:lnRef>
-          <a:fillRef idx="0">
-            <a:schemeClr val="dk1"/>
-          </a:fillRef>
-          <a:effectRef idx="1">
-            <a:schemeClr val="dk1"/>
-          </a:effectRef>
-          <a:fontRef idx="minor">
-            <a:schemeClr val="tx1"/>
-          </a:fontRef>
-        </p:style>
-      </p:cxnSp>
       <p:cxnSp>
         <p:nvCxnSpPr>
           <p:cNvPr id="50" name="Straight Arrow Connector 49"/>
@@ -6200,6 +6153,40 @@
           </a:fillRef>
           <a:effectRef idx="0">
             <a:schemeClr val="accent1"/>
+          </a:effectRef>
+          <a:fontRef idx="minor">
+            <a:schemeClr val="tx1"/>
+          </a:fontRef>
+        </p:style>
+      </p:cxnSp>
+      <p:cxnSp>
+        <p:nvCxnSpPr>
+          <p:cNvPr id="36" name="Straight Arrow Connector 35"/>
+          <p:cNvCxnSpPr/>
+          <p:nvPr/>
+        </p:nvCxnSpPr>
+        <p:spPr>
+          <a:xfrm>
+            <a:off x="1635355" y="1514364"/>
+            <a:ext cx="1081864" cy="0"/>
+          </a:xfrm>
+          <a:prstGeom prst="straightConnector1">
+            <a:avLst/>
+          </a:prstGeom>
+          <a:ln>
+            <a:headEnd type="arrow"/>
+            <a:tailEnd type="arrow"/>
+          </a:ln>
+        </p:spPr>
+        <p:style>
+          <a:lnRef idx="2">
+            <a:schemeClr val="dk1"/>
+          </a:lnRef>
+          <a:fillRef idx="0">
+            <a:schemeClr val="dk1"/>
+          </a:fillRef>
+          <a:effectRef idx="1">
+            <a:schemeClr val="dk1"/>
           </a:effectRef>
           <a:fontRef idx="minor">
             <a:schemeClr val="tx1"/>
@@ -6637,14 +6624,7 @@
                           <a:latin typeface="Times New Roman" panose="02020603050405020304" pitchFamily="18" charset="0"/>
                           <a:cs typeface="Times New Roman" panose="02020603050405020304" pitchFamily="18" charset="0"/>
                         </a:rPr>
-                        <a:t> (Input –Output</a:t>
-                      </a:r>
-                      <a:r>
-                        <a:rPr lang="en-US" sz="1600" baseline="0" dirty="0" smtClean="0">
-                          <a:latin typeface="Times New Roman" panose="02020603050405020304" pitchFamily="18" charset="0"/>
-                          <a:cs typeface="Times New Roman" panose="02020603050405020304" pitchFamily="18" charset="0"/>
-                        </a:rPr>
-                        <a:t>)</a:t>
+                        <a:t> (Input –Output)</a:t>
                       </a:r>
                       <a:endParaRPr lang="en-US" sz="1600" dirty="0">
                         <a:latin typeface="Times New Roman" panose="02020603050405020304" pitchFamily="18" charset="0"/>
@@ -6667,28 +6647,7 @@
                           <a:latin typeface="Times New Roman" panose="02020603050405020304" pitchFamily="18" charset="0"/>
                           <a:cs typeface="Times New Roman" panose="02020603050405020304" pitchFamily="18" charset="0"/>
                         </a:rPr>
-                        <a:t>USB : </a:t>
-                      </a:r>
-                      <a:r>
-                        <a:rPr lang="en-US" sz="1600" baseline="0" dirty="0" smtClean="0">
-                          <a:latin typeface="Times New Roman" panose="02020603050405020304" pitchFamily="18" charset="0"/>
-                          <a:cs typeface="Times New Roman" panose="02020603050405020304" pitchFamily="18" charset="0"/>
-                        </a:rPr>
-                        <a:t>  USB </a:t>
-                      </a:r>
-                      <a:r>
-                        <a:rPr lang="en-US" sz="1600" baseline="0" dirty="0" smtClean="0">
-                          <a:latin typeface="Times New Roman" panose="02020603050405020304" pitchFamily="18" charset="0"/>
-                          <a:cs typeface="Times New Roman" panose="02020603050405020304" pitchFamily="18" charset="0"/>
-                        </a:rPr>
-                        <a:t>connection (D+ and </a:t>
-                      </a:r>
-                      <a:r>
-                        <a:rPr lang="en-US" sz="1600" baseline="0" dirty="0" smtClean="0">
-                          <a:latin typeface="Times New Roman" panose="02020603050405020304" pitchFamily="18" charset="0"/>
-                          <a:cs typeface="Times New Roman" panose="02020603050405020304" pitchFamily="18" charset="0"/>
-                        </a:rPr>
-                        <a:t>D- lines)</a:t>
+                        <a:t>USB :   USB connection (D+ and D- lines)</a:t>
                       </a:r>
                       <a:endParaRPr lang="en-US" sz="1600" dirty="0">
                         <a:latin typeface="Times New Roman" panose="02020603050405020304" pitchFamily="18" charset="0"/>
@@ -6711,21 +6670,7 @@
                           <a:latin typeface="Times New Roman" panose="02020603050405020304" pitchFamily="18" charset="0"/>
                           <a:cs typeface="Times New Roman" panose="02020603050405020304" pitchFamily="18" charset="0"/>
                         </a:rPr>
-                        <a:t>  RX </a:t>
-                      </a:r>
-                      <a:r>
-                        <a:rPr lang="en-US" sz="1600" baseline="0" dirty="0" smtClean="0">
-                          <a:latin typeface="Times New Roman" panose="02020603050405020304" pitchFamily="18" charset="0"/>
-                          <a:cs typeface="Times New Roman" panose="02020603050405020304" pitchFamily="18" charset="0"/>
-                        </a:rPr>
-                        <a:t>and </a:t>
-                      </a:r>
-                      <a:r>
-                        <a:rPr lang="en-US" sz="1600" baseline="0" dirty="0" smtClean="0">
-                          <a:latin typeface="Times New Roman" panose="02020603050405020304" pitchFamily="18" charset="0"/>
-                          <a:cs typeface="Times New Roman" panose="02020603050405020304" pitchFamily="18" charset="0"/>
-                        </a:rPr>
-                        <a:t>TX lines to MCU UART0 pin</a:t>
+                        <a:t>  RX and TX lines to MCU UART0 pin</a:t>
                       </a:r>
                       <a:endParaRPr lang="en-US" sz="1600" dirty="0">
                         <a:latin typeface="Times New Roman" panose="02020603050405020304" pitchFamily="18" charset="0"/>
@@ -7361,14 +7306,7 @@
                       <a:latin typeface="Times New Roman" panose="02020603050405020304" pitchFamily="18" charset="0"/>
                       <a:cs typeface="Times New Roman" panose="02020603050405020304" pitchFamily="18" charset="0"/>
                     </a:rPr>
-                    <a:t>  </a:t>
-                  </a:r>
-                  <a:r>
-                    <a:rPr lang="en-US" altLang="en-US" sz="1600" dirty="0" smtClean="0">
-                      <a:latin typeface="Times New Roman" panose="02020603050405020304" pitchFamily="18" charset="0"/>
-                      <a:cs typeface="Times New Roman" panose="02020603050405020304" pitchFamily="18" charset="0"/>
-                    </a:rPr>
-                    <a:t>UART0</a:t>
+                    <a:t>  UART0</a:t>
                   </a:r>
                   <a:endParaRPr kumimoji="0" lang="en-US" altLang="en-US" sz="2800" b="0" i="0" u="none" strike="noStrike" cap="none" normalizeH="0" baseline="0" dirty="0" smtClean="0">
                     <a:ln>
@@ -8647,44 +8585,7 @@
                           <a:latin typeface="Times New Roman" panose="02020603050405020304" pitchFamily="18" charset="0"/>
                           <a:cs typeface="Times New Roman" panose="02020603050405020304" pitchFamily="18" charset="0"/>
                         </a:rPr>
-                        <a:t>Peripherals: </a:t>
-                      </a:r>
-                      <a:r>
-                        <a:rPr lang="en-US" sz="1400" baseline="0" dirty="0" smtClean="0">
-                          <a:latin typeface="Times New Roman" panose="02020603050405020304" pitchFamily="18" charset="0"/>
-                          <a:cs typeface="Times New Roman" panose="02020603050405020304" pitchFamily="18" charset="0"/>
-                        </a:rPr>
-                        <a:t>Connection to peripherals </a:t>
-                      </a:r>
-                      <a:r>
-                        <a:rPr lang="en-US" sz="1400" baseline="0" dirty="0" smtClean="0">
-                          <a:latin typeface="Times New Roman" panose="02020603050405020304" pitchFamily="18" charset="0"/>
-                          <a:cs typeface="Times New Roman" panose="02020603050405020304" pitchFamily="18" charset="0"/>
-                        </a:rPr>
-                        <a:t>which are at users discretion</a:t>
-                      </a:r>
-                      <a:endParaRPr lang="en-US" sz="1400" baseline="0" dirty="0" smtClean="0">
-                        <a:latin typeface="Times New Roman" panose="02020603050405020304" pitchFamily="18" charset="0"/>
-                        <a:cs typeface="Times New Roman" panose="02020603050405020304" pitchFamily="18" charset="0"/>
-                      </a:endParaRPr>
-                    </a:p>
-                    <a:p>
-                      <a:pPr marL="342900" indent="-342900">
-                        <a:buAutoNum type="arabicParenR"/>
-                      </a:pPr>
-                      <a:r>
-                        <a:rPr lang="en-US" sz="1400" baseline="0" dirty="0" smtClean="0">
-                          <a:latin typeface="Times New Roman" panose="02020603050405020304" pitchFamily="18" charset="0"/>
-                          <a:cs typeface="Times New Roman" panose="02020603050405020304" pitchFamily="18" charset="0"/>
-                        </a:rPr>
-                        <a:t>Debug: Connection </a:t>
-                      </a:r>
-                      <a:r>
-                        <a:rPr lang="en-US" sz="1400" baseline="0" dirty="0" smtClean="0">
-                          <a:latin typeface="Times New Roman" panose="02020603050405020304" pitchFamily="18" charset="0"/>
-                          <a:cs typeface="Times New Roman" panose="02020603050405020304" pitchFamily="18" charset="0"/>
-                        </a:rPr>
-                        <a:t>to 10-pin JTAG interface</a:t>
+                        <a:t>Peripherals: Connection to peripherals which are at users discretion</a:t>
                       </a:r>
                     </a:p>
                     <a:p>
@@ -8696,14 +8597,19 @@
                           <a:latin typeface="Times New Roman" panose="02020603050405020304" pitchFamily="18" charset="0"/>
                           <a:cs typeface="Times New Roman" panose="02020603050405020304" pitchFamily="18" charset="0"/>
                         </a:rPr>
-                        <a:t>RFIO: Radio input-output channel at 436.5 MHz </a:t>
+                        <a:t>Debug: Connection to 10-pin JTAG interface</a:t>
                       </a:r>
+                    </a:p>
+                    <a:p>
+                      <a:pPr marL="342900" indent="-342900">
+                        <a:buAutoNum type="arabicParenR"/>
+                      </a:pPr>
                       <a:r>
                         <a:rPr lang="en-US" sz="1400" baseline="0" dirty="0" smtClean="0">
                           <a:latin typeface="Times New Roman" panose="02020603050405020304" pitchFamily="18" charset="0"/>
                           <a:cs typeface="Times New Roman" panose="02020603050405020304" pitchFamily="18" charset="0"/>
                         </a:rPr>
-                        <a:t>passband</a:t>
+                        <a:t>RFIO: Radio input-output channel at 436.5 MHz passband</a:t>
                       </a:r>
                     </a:p>
                     <a:p>
@@ -9555,17 +9461,6 @@
                   </a:rPr>
                   <a:t>Peripherals</a:t>
                 </a:r>
-                <a:endParaRPr kumimoji="0" lang="en-US" altLang="en-US" sz="1600" b="0" i="0" u="none" strike="noStrike" cap="none" normalizeH="0" baseline="0" dirty="0" smtClean="0">
-                  <a:ln>
-                    <a:noFill/>
-                  </a:ln>
-                  <a:solidFill>
-                    <a:schemeClr val="tx1"/>
-                  </a:solidFill>
-                  <a:effectLst/>
-                  <a:latin typeface="Arial" pitchFamily="34" charset="0"/>
-                  <a:cs typeface="Arial" pitchFamily="34" charset="0"/>
-                </a:endParaRPr>
               </a:p>
             </p:txBody>
           </p:sp>

</xml_diff>